<commit_message>
Fixed a bug in failure tracking
</commit_message>
<xml_diff>
--- a/Harmony.pptx
+++ b/Harmony.pptx
@@ -3971,15 +3971,7 @@
           <a:p>
             <a:r>
               <a:rPr lang="en-US" dirty="0"/>
-              <a:t>Free Text Book </a:t>
-            </a:r>
-            <a:r>
-              <a:rPr lang="en-US"/>
-              <a:t>(143 </a:t>
-            </a:r>
-            <a:r>
-              <a:rPr lang="en-US" dirty="0"/>
-              <a:t>pages)</a:t>
+              <a:t>Free Text Book (143 pages)</a:t>
             </a:r>
           </a:p>
         </p:txBody>
@@ -5603,7 +5595,7 @@
             <a:pPr lvl="1"/>
             <a:r>
               <a:rPr lang="en-US" dirty="0"/>
-              <a:t>build your own interlock primitives</a:t>
+              <a:t>build your own atomic primitives</a:t>
             </a:r>
           </a:p>
           <a:p>

</xml_diff>

<commit_message>
Improved barrier synch description
</commit_message>
<xml_diff>
--- a/Harmony.pptx
+++ b/Harmony.pptx
@@ -209,7 +209,7 @@
           <a:p>
             <a:fld id="{DB050A5F-06C5-574D-A3AD-9B8109EC25B6}" type="datetimeFigureOut">
               <a:rPr lang="en-US" smtClean="0"/>
-              <a:t>4/7/21</a:t>
+              <a:t>4/12/21</a:t>
             </a:fld>
             <a:endParaRPr lang="en-US"/>
           </a:p>
@@ -859,7 +859,7 @@
           <a:p>
             <a:fld id="{E2688AD6-A3BD-2D4B-9B4D-77B376F56745}" type="datetimeFigureOut">
               <a:rPr lang="en-US" smtClean="0"/>
-              <a:t>4/7/21</a:t>
+              <a:t>4/12/21</a:t>
             </a:fld>
             <a:endParaRPr lang="en-US"/>
           </a:p>
@@ -1029,7 +1029,7 @@
           <a:p>
             <a:fld id="{E2688AD6-A3BD-2D4B-9B4D-77B376F56745}" type="datetimeFigureOut">
               <a:rPr lang="en-US" smtClean="0"/>
-              <a:t>4/7/21</a:t>
+              <a:t>4/12/21</a:t>
             </a:fld>
             <a:endParaRPr lang="en-US"/>
           </a:p>
@@ -1209,7 +1209,7 @@
           <a:p>
             <a:fld id="{E2688AD6-A3BD-2D4B-9B4D-77B376F56745}" type="datetimeFigureOut">
               <a:rPr lang="en-US" smtClean="0"/>
-              <a:t>4/7/21</a:t>
+              <a:t>4/12/21</a:t>
             </a:fld>
             <a:endParaRPr lang="en-US"/>
           </a:p>
@@ -1385,7 +1385,7 @@
           <a:p>
             <a:fld id="{E2688AD6-A3BD-2D4B-9B4D-77B376F56745}" type="datetimeFigureOut">
               <a:rPr lang="en-US" smtClean="0"/>
-              <a:t>4/7/21</a:t>
+              <a:t>4/12/21</a:t>
             </a:fld>
             <a:endParaRPr lang="en-US"/>
           </a:p>
@@ -1629,7 +1629,7 @@
           <a:p>
             <a:fld id="{E2688AD6-A3BD-2D4B-9B4D-77B376F56745}" type="datetimeFigureOut">
               <a:rPr lang="en-US" smtClean="0"/>
-              <a:t>4/7/21</a:t>
+              <a:t>4/12/21</a:t>
             </a:fld>
             <a:endParaRPr lang="en-US"/>
           </a:p>
@@ -1861,7 +1861,7 @@
           <a:p>
             <a:fld id="{E2688AD6-A3BD-2D4B-9B4D-77B376F56745}" type="datetimeFigureOut">
               <a:rPr lang="en-US" smtClean="0"/>
-              <a:t>4/7/21</a:t>
+              <a:t>4/12/21</a:t>
             </a:fld>
             <a:endParaRPr lang="en-US"/>
           </a:p>
@@ -2228,7 +2228,7 @@
           <a:p>
             <a:fld id="{E2688AD6-A3BD-2D4B-9B4D-77B376F56745}" type="datetimeFigureOut">
               <a:rPr lang="en-US" smtClean="0"/>
-              <a:t>4/7/21</a:t>
+              <a:t>4/12/21</a:t>
             </a:fld>
             <a:endParaRPr lang="en-US"/>
           </a:p>
@@ -2346,7 +2346,7 @@
           <a:p>
             <a:fld id="{E2688AD6-A3BD-2D4B-9B4D-77B376F56745}" type="datetimeFigureOut">
               <a:rPr lang="en-US" smtClean="0"/>
-              <a:t>4/7/21</a:t>
+              <a:t>4/12/21</a:t>
             </a:fld>
             <a:endParaRPr lang="en-US"/>
           </a:p>
@@ -2441,7 +2441,7 @@
           <a:p>
             <a:fld id="{E2688AD6-A3BD-2D4B-9B4D-77B376F56745}" type="datetimeFigureOut">
               <a:rPr lang="en-US" smtClean="0"/>
-              <a:t>4/7/21</a:t>
+              <a:t>4/12/21</a:t>
             </a:fld>
             <a:endParaRPr lang="en-US"/>
           </a:p>
@@ -2718,7 +2718,7 @@
           <a:p>
             <a:fld id="{E2688AD6-A3BD-2D4B-9B4D-77B376F56745}" type="datetimeFigureOut">
               <a:rPr lang="en-US" smtClean="0"/>
-              <a:t>4/7/21</a:t>
+              <a:t>4/12/21</a:t>
             </a:fld>
             <a:endParaRPr lang="en-US"/>
           </a:p>
@@ -2975,7 +2975,7 @@
           <a:p>
             <a:fld id="{E2688AD6-A3BD-2D4B-9B4D-77B376F56745}" type="datetimeFigureOut">
               <a:rPr lang="en-US" smtClean="0"/>
-              <a:t>4/7/21</a:t>
+              <a:t>4/12/21</a:t>
             </a:fld>
             <a:endParaRPr lang="en-US"/>
           </a:p>
@@ -3188,7 +3188,7 @@
           <a:p>
             <a:fld id="{E2688AD6-A3BD-2D4B-9B4D-77B376F56745}" type="datetimeFigureOut">
               <a:rPr lang="en-US" smtClean="0"/>
-              <a:t>4/7/21</a:t>
+              <a:t>4/12/21</a:t>
             </a:fld>
             <a:endParaRPr lang="en-US"/>
           </a:p>
@@ -3776,7 +3776,7 @@
 </file>
 
 <file path=ppt/slides/slide11.xml><?xml version="1.0" encoding="utf-8"?>
-<p:sld xmlns:a="http://schemas.openxmlformats.org/drawingml/2006/main" xmlns:r="http://schemas.openxmlformats.org/officeDocument/2006/relationships" xmlns:p="http://schemas.openxmlformats.org/presentationml/2006/main">
+<p:sld xmlns:a="http://schemas.openxmlformats.org/drawingml/2006/main" xmlns:r="http://schemas.openxmlformats.org/officeDocument/2006/relationships" xmlns:p="http://schemas.openxmlformats.org/presentationml/2006/main" show="0">
   <p:cSld>
     <p:spTree>
       <p:nvGrpSpPr>
@@ -4103,6 +4103,45 @@
           <a:lstStyle/>
           <a:p>
             <a:r>
+              <a:rPr lang="en-US" i="1" dirty="0">
+                <a:solidFill>
+                  <a:srgbClr val="00B050"/>
+                </a:solidFill>
+              </a:rPr>
+              <a:t>Students were able to use this immediately</a:t>
+            </a:r>
+          </a:p>
+          <a:p>
+            <a:r>
+              <a:rPr lang="en-US" i="1" dirty="0">
+                <a:solidFill>
+                  <a:srgbClr val="00B050"/>
+                </a:solidFill>
+              </a:rPr>
+              <a:t>Significantly better solutions to problem sets</a:t>
+            </a:r>
+          </a:p>
+          <a:p>
+            <a:r>
+              <a:rPr lang="en-US" dirty="0"/>
+              <a:t>Harmony is not an oracle: students still need to specify what assertions/invariants to check</a:t>
+            </a:r>
+          </a:p>
+          <a:p>
+            <a:r>
+              <a:rPr lang="en-US" dirty="0"/>
+              <a:t>Homework assignments can be auto-graded</a:t>
+            </a:r>
+          </a:p>
+          <a:p>
+            <a:pPr lvl="1"/>
+            <a:r>
+              <a:rPr lang="en-US" dirty="0"/>
+              <a:t>Understandable bug reports to students</a:t>
+            </a:r>
+          </a:p>
+          <a:p>
+            <a:r>
               <a:rPr lang="en-US" dirty="0"/>
               <a:t>Integrated with Microsoft Visual Studio Code IDE</a:t>
             </a:r>
@@ -4111,43 +4150,6 @@
             <a:r>
               <a:rPr lang="en-US" dirty="0"/>
               <a:t>A purely online IDE available running in the cloud</a:t>
-            </a:r>
-          </a:p>
-          <a:p>
-            <a:r>
-              <a:rPr lang="en-US" dirty="0"/>
-              <a:t>Students were able to use this immediately</a:t>
-            </a:r>
-          </a:p>
-          <a:p>
-            <a:r>
-              <a:rPr lang="en-US" dirty="0"/>
-              <a:t>Significantly better solutions to problem sets</a:t>
-            </a:r>
-          </a:p>
-          <a:p>
-            <a:r>
-              <a:rPr lang="en-US" dirty="0"/>
-              <a:t>Students still need to write the test programs</a:t>
-            </a:r>
-          </a:p>
-          <a:p>
-            <a:pPr lvl="1"/>
-            <a:r>
-              <a:rPr lang="en-US" dirty="0"/>
-              <a:t>and add assertions and/or invariants</a:t>
-            </a:r>
-          </a:p>
-          <a:p>
-            <a:r>
-              <a:rPr lang="en-US" dirty="0"/>
-              <a:t>Solutions can be auto-graded</a:t>
-            </a:r>
-          </a:p>
-          <a:p>
-            <a:r>
-              <a:rPr lang="en-US" dirty="0"/>
-              <a:t>Understandable bug reports to students</a:t>
             </a:r>
           </a:p>
           <a:p>
@@ -4312,7 +4314,7 @@
                   <a:srgbClr val="FF0000"/>
                 </a:solidFill>
               </a:rPr>
-              <a:t>, most students were unable to solve most concurrency problems correctly</a:t>
+              <a:t>, most students were unable to solve most concurrency homework problems correctly</a:t>
             </a:r>
           </a:p>
           <a:p>
@@ -4329,14 +4331,30 @@
                   <a:srgbClr val="FF0000"/>
                 </a:solidFill>
               </a:rPr>
-              <a:t>Teaching staff spent lots of time checking solutions visually and giving feedback to students</a:t>
+              <a:t>Teaching staff were spending a lot of time checking solutions </a:t>
+            </a:r>
+            <a:r>
+              <a:rPr lang="en-US" i="1" dirty="0">
+                <a:solidFill>
+                  <a:srgbClr val="FF0000"/>
+                </a:solidFill>
+              </a:rPr>
+              <a:t>visually</a:t>
+            </a:r>
+            <a:r>
+              <a:rPr lang="en-US" dirty="0">
+                <a:solidFill>
+                  <a:srgbClr val="FF0000"/>
+                </a:solidFill>
+              </a:rPr>
+              <a:t> and providing detailed feedback</a:t>
             </a:r>
           </a:p>
           <a:p>
             <a:pPr lvl="1"/>
             <a:r>
               <a:rPr lang="en-US" dirty="0"/>
-              <a:t>and also made plenty mistakes</a:t>
+              <a:t>and also made mistakes</a:t>
             </a:r>
           </a:p>
         </p:txBody>
@@ -4447,7 +4465,7 @@
                   <a:srgbClr val="FF0000"/>
                 </a:solidFill>
               </a:rPr>
-              <a:t>, most students were unable to solve most concurrency problems correctly</a:t>
+              <a:t>, most students were unable to solve most concurrency homework problems correctly</a:t>
             </a:r>
           </a:p>
           <a:p>
@@ -4464,14 +4482,30 @@
                   <a:srgbClr val="FF0000"/>
                 </a:solidFill>
               </a:rPr>
-              <a:t>Teaching staff spent lots of time checking solutions visually and giving feedback to students</a:t>
+              <a:t>Teaching staff were spending a lot of time checking solutions </a:t>
+            </a:r>
+            <a:r>
+              <a:rPr lang="en-US" i="1" dirty="0">
+                <a:solidFill>
+                  <a:srgbClr val="FF0000"/>
+                </a:solidFill>
+              </a:rPr>
+              <a:t>visually</a:t>
+            </a:r>
+            <a:r>
+              <a:rPr lang="en-US" dirty="0">
+                <a:solidFill>
+                  <a:srgbClr val="FF0000"/>
+                </a:solidFill>
+              </a:rPr>
+              <a:t> and providing detailed feedback</a:t>
             </a:r>
           </a:p>
           <a:p>
             <a:pPr lvl="1"/>
             <a:r>
               <a:rPr lang="en-US" dirty="0"/>
-              <a:t>and also made plenty mistakes</a:t>
+              <a:t>and also made mistakes</a:t>
             </a:r>
           </a:p>
           <a:p>
@@ -4608,7 +4642,7 @@
                   <a:schemeClr val="accent6"/>
                 </a:solidFill>
               </a:rPr>
-              <a:t>Discovers easy to explain bugs</a:t>
+              <a:t>Gives short “counter-examples”</a:t>
             </a:r>
           </a:p>
           <a:p>
@@ -4794,7 +4828,7 @@
                   <a:schemeClr val="accent6"/>
                 </a:solidFill>
               </a:rPr>
-              <a:t>Discovers easy to explain bugs</a:t>
+              <a:t>Gives short “counter-examples”</a:t>
             </a:r>
           </a:p>
           <a:p>
@@ -5638,7 +5672,7 @@
             <a:pPr lvl="1"/>
             <a:r>
               <a:rPr lang="en-US" dirty="0"/>
-              <a:t>invariant violations, uninitialized variables, divide-by-zero, etc.</a:t>
+              <a:t>Assertion/invariant violations, uninitialized variables, divide-by-zero, etc.</a:t>
             </a:r>
           </a:p>
           <a:p>
@@ -5651,7 +5685,7 @@
             <a:pPr lvl="1"/>
             <a:r>
               <a:rPr lang="en-US" dirty="0"/>
-              <a:t>non-termination</a:t>
+              <a:t>Absence of deadlock</a:t>
             </a:r>
           </a:p>
           <a:p>
@@ -5842,7 +5876,7 @@
           <a:p>
             <a:r>
               <a:rPr lang="en-US" dirty="0"/>
-              <a:t>Features beyond Python</a:t>
+              <a:t>Harmony features beyond Python</a:t>
             </a:r>
           </a:p>
         </p:txBody>
@@ -5871,7 +5905,7 @@
         </p:spPr>
         <p:txBody>
           <a:bodyPr>
-            <a:normAutofit fontScale="77500" lnSpcReduction="20000"/>
+            <a:normAutofit fontScale="92500" lnSpcReduction="20000"/>
           </a:bodyPr>
           <a:lstStyle/>
           <a:p>
@@ -5901,7 +5935,7 @@
             <a:pPr lvl="1"/>
             <a:r>
               <a:rPr lang="en-US" dirty="0"/>
-              <a:t>spinlocks, condition variables (both Mesa and Hoare), semaphores, synchronized queues, barrier synch, etc.</a:t>
+              <a:t>locks, condition variables (both Mesa and Hoare), semaphores, synchronized queues, barrier synch, etc.</a:t>
             </a:r>
             <a:endParaRPr lang="en-US" i="1" dirty="0"/>
           </a:p>
@@ -5929,7 +5963,7 @@
             <a:pPr lvl="1"/>
             <a:r>
               <a:rPr lang="en-US" dirty="0"/>
-              <a:t>build your own atomic primitives</a:t>
+              <a:t>build your own synch primitives</a:t>
             </a:r>
           </a:p>
           <a:p>
@@ -5981,23 +6015,6 @@
             <a:r>
               <a:rPr lang="en-US" dirty="0"/>
               <a:t>predicates checked in every state</a:t>
-            </a:r>
-          </a:p>
-          <a:p>
-            <a:r>
-              <a:rPr lang="en-US" dirty="0">
-                <a:solidFill>
-                  <a:srgbClr val="00B050"/>
-                </a:solidFill>
-              </a:rPr>
-              <a:t>Liveness checking</a:t>
-            </a:r>
-          </a:p>
-          <a:p>
-            <a:pPr lvl="1"/>
-            <a:r>
-              <a:rPr lang="en-US" dirty="0"/>
-              <a:t>without temporal logic formalism</a:t>
             </a:r>
           </a:p>
           <a:p>
@@ -6036,7 +6053,7 @@
         </p:nvSpPr>
         <p:spPr>
           <a:xfrm>
-            <a:off x="5742219" y="2461433"/>
+            <a:off x="5742219" y="2704165"/>
             <a:ext cx="2773131" cy="523220"/>
           </a:xfrm>
           <a:prstGeom prst="rect">
@@ -6075,7 +6092,7 @@
         </p:nvSpPr>
         <p:spPr>
           <a:xfrm>
-            <a:off x="5742219" y="4244785"/>
+            <a:off x="5742219" y="4874479"/>
             <a:ext cx="2875274" cy="523220"/>
           </a:xfrm>
           <a:prstGeom prst="rect">
@@ -6114,7 +6131,7 @@
         </p:nvSpPr>
         <p:spPr>
           <a:xfrm>
-            <a:off x="5742219" y="3610412"/>
+            <a:off x="5742219" y="4127647"/>
             <a:ext cx="1933158" cy="523220"/>
           </a:xfrm>
           <a:prstGeom prst="rect">
@@ -6200,7 +6217,7 @@
         </p:nvSpPr>
         <p:spPr>
           <a:xfrm>
-            <a:off x="5742219" y="3002512"/>
+            <a:off x="5742219" y="3380815"/>
             <a:ext cx="2419124" cy="523220"/>
           </a:xfrm>
           <a:prstGeom prst="rect">
@@ -6239,7 +6256,7 @@
         </p:nvSpPr>
         <p:spPr>
           <a:xfrm>
-            <a:off x="5742219" y="1917371"/>
+            <a:off x="5742219" y="2035099"/>
             <a:ext cx="2626040" cy="523220"/>
           </a:xfrm>
           <a:prstGeom prst="rect">

</xml_diff>